<commit_message>
Added anatomy of a figure
</commit_message>
<xml_diff>
--- a/2016/computing_workgroup/python_plotting/python_plotting.pptx
+++ b/2016/computing_workgroup/python_plotting/python_plotting.pptx
@@ -5,7 +5,7 @@
     <p:sldMasterId id="2147483648" r:id="rId1"/>
   </p:sldMasterIdLst>
   <p:notesMasterIdLst>
-    <p:notesMasterId r:id="rId16"/>
+    <p:notesMasterId r:id="rId17"/>
   </p:notesMasterIdLst>
   <p:sldIdLst>
     <p:sldId id="256" r:id="rId2"/>
@@ -16,12 +16,13 @@
     <p:sldId id="349" r:id="rId7"/>
     <p:sldId id="350" r:id="rId8"/>
     <p:sldId id="343" r:id="rId9"/>
-    <p:sldId id="351" r:id="rId10"/>
-    <p:sldId id="344" r:id="rId11"/>
-    <p:sldId id="345" r:id="rId12"/>
-    <p:sldId id="346" r:id="rId13"/>
-    <p:sldId id="339" r:id="rId14"/>
-    <p:sldId id="340" r:id="rId15"/>
+    <p:sldId id="352" r:id="rId10"/>
+    <p:sldId id="351" r:id="rId11"/>
+    <p:sldId id="344" r:id="rId12"/>
+    <p:sldId id="345" r:id="rId13"/>
+    <p:sldId id="346" r:id="rId14"/>
+    <p:sldId id="339" r:id="rId15"/>
+    <p:sldId id="340" r:id="rId16"/>
   </p:sldIdLst>
   <p:sldSz cx="9144000" cy="6858000" type="screen4x3"/>
   <p:notesSz cx="6858000" cy="9144000"/>
@@ -3149,7 +3150,11 @@
           <a:p>
             <a:r>
               <a:rPr lang="en-US" dirty="0" err="1" smtClean="0"/>
-              <a:t>seaborn</a:t>
+              <a:t>matplotlib</a:t>
+            </a:r>
+            <a:r>
+              <a:rPr lang="en-US" dirty="0" smtClean="0"/>
+              <a:t> examples</a:t>
             </a:r>
             <a:endParaRPr lang="en-US" dirty="0"/>
           </a:p>
@@ -3172,31 +3177,43 @@
           <a:p>
             <a:r>
               <a:rPr lang="en-US" dirty="0" smtClean="0"/>
-              <a:t>At minimum: nicer styling than </a:t>
-            </a:r>
+              <a:t>Line/scatter</a:t>
+            </a:r>
+          </a:p>
+          <a:p>
+            <a:r>
+              <a:rPr lang="en-US" dirty="0" smtClean="0"/>
+              <a:t>histogram</a:t>
+            </a:r>
+          </a:p>
+          <a:p>
             <a:r>
               <a:rPr lang="en-US" dirty="0" err="1" smtClean="0"/>
-              <a:t>matplotlib</a:t>
+              <a:t>imshow</a:t>
             </a:r>
             <a:r>
               <a:rPr lang="en-US" dirty="0" smtClean="0"/>
-              <a:t> defaults…</a:t>
+              <a:t>/contour</a:t>
             </a:r>
           </a:p>
           <a:p>
             <a:r>
               <a:rPr lang="en-US" dirty="0" smtClean="0"/>
-              <a:t>At best: save yourself from reinventing the same wheel over and over and over…</a:t>
-            </a:r>
-          </a:p>
-          <a:p>
+              <a:t>XKCD style</a:t>
+            </a:r>
+          </a:p>
+          <a:p>
+            <a:r>
+              <a:rPr lang="en-US" dirty="0" smtClean="0"/>
+              <a:t>Swag examples, including annotation (</a:t>
+            </a:r>
             <a:r>
               <a:rPr lang="en-US" dirty="0" err="1" smtClean="0"/>
-              <a:t>Heatmap</a:t>
+              <a:t>LaTeX</a:t>
             </a:r>
             <a:r>
               <a:rPr lang="en-US" dirty="0" smtClean="0"/>
-              <a:t>, joint plot</a:t>
+              <a:t> callout)</a:t>
             </a:r>
             <a:endParaRPr lang="en-US" dirty="0"/>
           </a:p>
@@ -3205,7 +3222,7 @@
     </p:spTree>
     <p:extLst>
       <p:ext uri="{BB962C8B-B14F-4D97-AF65-F5344CB8AC3E}">
-        <p14:creationId xmlns:p14="http://schemas.microsoft.com/office/powerpoint/2010/main" val="1635058179"/>
+        <p14:creationId xmlns:p14="http://schemas.microsoft.com/office/powerpoint/2010/main" val="2885079352"/>
       </p:ext>
     </p:extLst>
   </p:cSld>
@@ -3249,7 +3266,7 @@
           <a:p>
             <a:r>
               <a:rPr lang="en-US" dirty="0" err="1" smtClean="0"/>
-              <a:t>bokeh</a:t>
+              <a:t>seaborn</a:t>
             </a:r>
             <a:endParaRPr lang="en-US" dirty="0"/>
           </a:p>
@@ -3272,19 +3289,31 @@
           <a:p>
             <a:r>
               <a:rPr lang="en-US" dirty="0" smtClean="0"/>
-              <a:t>Interactive graphs for the web</a:t>
-            </a:r>
-          </a:p>
-          <a:p>
+              <a:t>At minimum: nicer styling than </a:t>
+            </a:r>
+            <a:r>
+              <a:rPr lang="en-US" dirty="0" err="1" smtClean="0"/>
+              <a:t>matplotlib</a:t>
+            </a:r>
             <a:r>
               <a:rPr lang="en-US" dirty="0" smtClean="0"/>
-              <a:t>With server backend, can produce very sophisticated interactions</a:t>
+              <a:t> defaults…</a:t>
             </a:r>
           </a:p>
           <a:p>
             <a:r>
               <a:rPr lang="en-US" dirty="0" smtClean="0"/>
-              <a:t>But even without, can provide nice dataset exploration tools</a:t>
+              <a:t>At best: save yourself from reinventing the same wheel over and over and over…</a:t>
+            </a:r>
+          </a:p>
+          <a:p>
+            <a:r>
+              <a:rPr lang="en-US" dirty="0" err="1" smtClean="0"/>
+              <a:t>Heatmap</a:t>
+            </a:r>
+            <a:r>
+              <a:rPr lang="en-US" dirty="0" smtClean="0"/>
+              <a:t>, joint plot</a:t>
             </a:r>
             <a:endParaRPr lang="en-US" dirty="0"/>
           </a:p>
@@ -3293,7 +3322,7 @@
     </p:spTree>
     <p:extLst>
       <p:ext uri="{BB962C8B-B14F-4D97-AF65-F5344CB8AC3E}">
-        <p14:creationId xmlns:p14="http://schemas.microsoft.com/office/powerpoint/2010/main" val="2072717869"/>
+        <p14:creationId xmlns:p14="http://schemas.microsoft.com/office/powerpoint/2010/main" val="1635058179"/>
       </p:ext>
     </p:extLst>
   </p:cSld>
@@ -3336,39 +3365,43 @@
           <a:lstStyle/>
           <a:p>
             <a:r>
+              <a:rPr lang="en-US" dirty="0" err="1" smtClean="0"/>
+              <a:t>bokeh</a:t>
+            </a:r>
+            <a:endParaRPr lang="en-US" dirty="0"/>
+          </a:p>
+        </p:txBody>
+      </p:sp>
+      <p:sp>
+        <p:nvSpPr>
+          <p:cNvPr id="3" name="Content Placeholder 2"/>
+          <p:cNvSpPr>
+            <a:spLocks noGrp="1"/>
+          </p:cNvSpPr>
+          <p:nvPr>
+            <p:ph idx="1"/>
+          </p:nvPr>
+        </p:nvSpPr>
+        <p:spPr/>
+        <p:txBody>
+          <a:bodyPr/>
+          <a:lstStyle/>
+          <a:p>
+            <a:r>
               <a:rPr lang="en-US" dirty="0" smtClean="0"/>
-              <a:t>Other libraries of interest</a:t>
-            </a:r>
-            <a:endParaRPr lang="en-US" dirty="0"/>
-          </a:p>
-        </p:txBody>
-      </p:sp>
-      <p:sp>
-        <p:nvSpPr>
-          <p:cNvPr id="3" name="Content Placeholder 2"/>
-          <p:cNvSpPr>
-            <a:spLocks noGrp="1"/>
-          </p:cNvSpPr>
-          <p:nvPr>
-            <p:ph idx="1"/>
-          </p:nvPr>
-        </p:nvSpPr>
-        <p:spPr/>
-        <p:txBody>
-          <a:bodyPr/>
-          <a:lstStyle/>
-          <a:p>
-            <a:r>
-              <a:rPr lang="en-US" dirty="0" err="1" smtClean="0"/>
-              <a:t>ggplot</a:t>
-            </a:r>
+              <a:t>Interactive graphs for the web</a:t>
+            </a:r>
+          </a:p>
+          <a:p>
             <a:r>
               <a:rPr lang="en-US" dirty="0" smtClean="0"/>
-              <a:t>, mpld3, </a:t>
-            </a:r>
-            <a:r>
-              <a:rPr lang="en-US" dirty="0" err="1" smtClean="0"/>
-              <a:t>datashader</a:t>
+              <a:t>With server backend, can produce very sophisticated interactions</a:t>
+            </a:r>
+          </a:p>
+          <a:p>
+            <a:r>
+              <a:rPr lang="en-US" dirty="0" smtClean="0"/>
+              <a:t>But even without, can provide nice dataset exploration tools</a:t>
             </a:r>
             <a:endParaRPr lang="en-US" dirty="0"/>
           </a:p>
@@ -3377,7 +3410,7 @@
     </p:spTree>
     <p:extLst>
       <p:ext uri="{BB962C8B-B14F-4D97-AF65-F5344CB8AC3E}">
-        <p14:creationId xmlns:p14="http://schemas.microsoft.com/office/powerpoint/2010/main" val="3995809367"/>
+        <p14:creationId xmlns:p14="http://schemas.microsoft.com/office/powerpoint/2010/main" val="2072717869"/>
       </p:ext>
     </p:extLst>
   </p:cSld>
@@ -3414,6 +3447,90 @@
             <p:ph type="title"/>
           </p:nvPr>
         </p:nvSpPr>
+        <p:spPr/>
+        <p:txBody>
+          <a:bodyPr/>
+          <a:lstStyle/>
+          <a:p>
+            <a:r>
+              <a:rPr lang="en-US" dirty="0" smtClean="0"/>
+              <a:t>Other libraries of interest</a:t>
+            </a:r>
+            <a:endParaRPr lang="en-US" dirty="0"/>
+          </a:p>
+        </p:txBody>
+      </p:sp>
+      <p:sp>
+        <p:nvSpPr>
+          <p:cNvPr id="3" name="Content Placeholder 2"/>
+          <p:cNvSpPr>
+            <a:spLocks noGrp="1"/>
+          </p:cNvSpPr>
+          <p:nvPr>
+            <p:ph idx="1"/>
+          </p:nvPr>
+        </p:nvSpPr>
+        <p:spPr/>
+        <p:txBody>
+          <a:bodyPr/>
+          <a:lstStyle/>
+          <a:p>
+            <a:r>
+              <a:rPr lang="en-US" dirty="0" err="1" smtClean="0"/>
+              <a:t>ggplot</a:t>
+            </a:r>
+            <a:r>
+              <a:rPr lang="en-US" dirty="0" smtClean="0"/>
+              <a:t>, mpld3, </a:t>
+            </a:r>
+            <a:r>
+              <a:rPr lang="en-US" dirty="0" err="1" smtClean="0"/>
+              <a:t>datashader</a:t>
+            </a:r>
+            <a:endParaRPr lang="en-US" dirty="0"/>
+          </a:p>
+        </p:txBody>
+      </p:sp>
+    </p:spTree>
+    <p:extLst>
+      <p:ext uri="{BB962C8B-B14F-4D97-AF65-F5344CB8AC3E}">
+        <p14:creationId xmlns:p14="http://schemas.microsoft.com/office/powerpoint/2010/main" val="3995809367"/>
+      </p:ext>
+    </p:extLst>
+  </p:cSld>
+  <p:clrMapOvr>
+    <a:masterClrMapping/>
+  </p:clrMapOvr>
+</p:sld>
+</file>
+
+<file path=ppt/slides/slide14.xml><?xml version="1.0" encoding="utf-8"?>
+<p:sld xmlns:a="http://schemas.openxmlformats.org/drawingml/2006/main" xmlns:r="http://schemas.openxmlformats.org/officeDocument/2006/relationships" xmlns:p="http://schemas.openxmlformats.org/presentationml/2006/main">
+  <p:cSld>
+    <p:spTree>
+      <p:nvGrpSpPr>
+        <p:cNvPr id="1" name=""/>
+        <p:cNvGrpSpPr/>
+        <p:nvPr/>
+      </p:nvGrpSpPr>
+      <p:grpSpPr>
+        <a:xfrm>
+          <a:off x="0" y="0"/>
+          <a:ext cx="0" cy="0"/>
+          <a:chOff x="0" y="0"/>
+          <a:chExt cx="0" cy="0"/>
+        </a:xfrm>
+      </p:grpSpPr>
+      <p:sp>
+        <p:nvSpPr>
+          <p:cNvPr id="2" name="Title 1"/>
+          <p:cNvSpPr>
+            <a:spLocks noGrp="1"/>
+          </p:cNvSpPr>
+          <p:nvPr>
+            <p:ph type="title"/>
+          </p:nvPr>
+        </p:nvSpPr>
         <p:spPr>
           <a:xfrm>
             <a:off x="457200" y="2874722"/>
@@ -3445,7 +3562,7 @@
 </p:sld>
 </file>
 
-<file path=ppt/slides/slide14.xml><?xml version="1.0" encoding="utf-8"?>
+<file path=ppt/slides/slide15.xml><?xml version="1.0" encoding="utf-8"?>
 <p:sld xmlns:a="http://schemas.openxmlformats.org/drawingml/2006/main" xmlns:r="http://schemas.openxmlformats.org/officeDocument/2006/relationships" xmlns:p="http://schemas.openxmlformats.org/presentationml/2006/main">
   <p:cSld>
     <p:spTree>
@@ -4624,12 +4741,16 @@
           <a:lstStyle/>
           <a:p>
             <a:r>
+              <a:rPr lang="en-US" dirty="0" smtClean="0"/>
+              <a:t>Anatomy of a </a:t>
+            </a:r>
+            <a:r>
               <a:rPr lang="en-US" dirty="0" err="1" smtClean="0"/>
               <a:t>matplotlib</a:t>
             </a:r>
             <a:r>
               <a:rPr lang="en-US" dirty="0" smtClean="0"/>
-              <a:t> examples</a:t>
+              <a:t> figure</a:t>
             </a:r>
             <a:endParaRPr lang="en-US" dirty="0"/>
           </a:p>
@@ -4652,43 +4773,40 @@
           <a:p>
             <a:r>
               <a:rPr lang="en-US" dirty="0" smtClean="0"/>
-              <a:t>Line/scatter</a:t>
-            </a:r>
-          </a:p>
-          <a:p>
+              <a:t>…in the form of a </a:t>
+            </a:r>
+            <a:r>
+              <a:rPr lang="en-US" dirty="0" err="1" smtClean="0"/>
+              <a:t>matplotlib</a:t>
+            </a:r>
             <a:r>
               <a:rPr lang="en-US" dirty="0" smtClean="0"/>
-              <a:t>histogram</a:t>
-            </a:r>
-          </a:p>
-          <a:p>
-            <a:r>
-              <a:rPr lang="en-US" dirty="0" err="1" smtClean="0"/>
-              <a:t>imshow</a:t>
+              <a:t> figure!</a:t>
+            </a:r>
+          </a:p>
+          <a:p>
+            <a:pPr lvl="1"/>
+            <a:r>
+              <a:rPr lang="en-US" dirty="0" smtClean="0">
+                <a:hlinkClick r:id="rId2"/>
+              </a:rPr>
+              <a:t>https</a:t>
+            </a:r>
+            <a:r>
+              <a:rPr lang="en-US" dirty="0">
+                <a:hlinkClick r:id="rId2"/>
+              </a:rPr>
+              <a:t>://</a:t>
+            </a:r>
+            <a:r>
+              <a:rPr lang="en-US" dirty="0" smtClean="0">
+                <a:hlinkClick r:id="rId2"/>
+              </a:rPr>
+              <a:t>github.com/rougier/figure-anatomy</a:t>
             </a:r>
             <a:r>
               <a:rPr lang="en-US" dirty="0" smtClean="0"/>
-              <a:t>/contour</a:t>
-            </a:r>
-          </a:p>
-          <a:p>
-            <a:r>
-              <a:rPr lang="en-US" dirty="0" smtClean="0"/>
-              <a:t>XKCD style</a:t>
-            </a:r>
-          </a:p>
-          <a:p>
-            <a:r>
-              <a:rPr lang="en-US" dirty="0" smtClean="0"/>
-              <a:t>Swag examples, including annotation (</a:t>
-            </a:r>
-            <a:r>
-              <a:rPr lang="en-US" dirty="0" err="1" smtClean="0"/>
-              <a:t>LaTeX</a:t>
-            </a:r>
-            <a:r>
-              <a:rPr lang="en-US" dirty="0" smtClean="0"/>
-              <a:t> callout)</a:t>
+              <a:t> </a:t>
             </a:r>
             <a:endParaRPr lang="en-US" dirty="0"/>
           </a:p>
@@ -4697,7 +4815,7 @@
     </p:spTree>
     <p:extLst>
       <p:ext uri="{BB962C8B-B14F-4D97-AF65-F5344CB8AC3E}">
-        <p14:creationId xmlns:p14="http://schemas.microsoft.com/office/powerpoint/2010/main" val="2885079352"/>
+        <p14:creationId xmlns:p14="http://schemas.microsoft.com/office/powerpoint/2010/main" val="2310323062"/>
       </p:ext>
     </p:extLst>
   </p:cSld>

</xml_diff>

<commit_message>
Added seaborn examples and updated slides
</commit_message>
<xml_diff>
--- a/2016/computing_workgroup/python_plotting/python_plotting.pptx
+++ b/2016/computing_workgroup/python_plotting/python_plotting.pptx
@@ -5,7 +5,7 @@
     <p:sldMasterId id="2147483648" r:id="rId1"/>
   </p:sldMasterIdLst>
   <p:notesMasterIdLst>
-    <p:notesMasterId r:id="rId17"/>
+    <p:notesMasterId r:id="rId18"/>
   </p:notesMasterIdLst>
   <p:sldIdLst>
     <p:sldId id="256" r:id="rId2"/>
@@ -18,11 +18,12 @@
     <p:sldId id="343" r:id="rId9"/>
     <p:sldId id="352" r:id="rId10"/>
     <p:sldId id="351" r:id="rId11"/>
-    <p:sldId id="344" r:id="rId12"/>
-    <p:sldId id="345" r:id="rId13"/>
-    <p:sldId id="346" r:id="rId14"/>
-    <p:sldId id="339" r:id="rId15"/>
-    <p:sldId id="340" r:id="rId16"/>
+    <p:sldId id="353" r:id="rId12"/>
+    <p:sldId id="344" r:id="rId13"/>
+    <p:sldId id="345" r:id="rId14"/>
+    <p:sldId id="346" r:id="rId15"/>
+    <p:sldId id="339" r:id="rId16"/>
+    <p:sldId id="340" r:id="rId17"/>
   </p:sldIdLst>
   <p:sldSz cx="9144000" cy="6858000" type="screen4x3"/>
   <p:notesSz cx="6858000" cy="9144000"/>
@@ -222,7 +223,7 @@
           <a:p>
             <a:fld id="{6096A192-89F2-44C6-B07F-1B83CE44D511}" type="datetimeFigureOut">
               <a:rPr lang="en-US" smtClean="0"/>
-              <a:t>9/28/2016</a:t>
+              <a:t>9/29/2016</a:t>
             </a:fld>
             <a:endParaRPr lang="en-US"/>
           </a:p>
@@ -783,7 +784,7 @@
           <a:p>
             <a:fld id="{7181039F-CB0C-E14D-A7EF-3BACE2CEF4EA}" type="datetimeFigureOut">
               <a:rPr lang="en-US" smtClean="0"/>
-              <a:t>9/28/2016</a:t>
+              <a:t>9/29/2016</a:t>
             </a:fld>
             <a:endParaRPr lang="en-US"/>
           </a:p>
@@ -1043,7 +1044,7 @@
           <a:p>
             <a:fld id="{7181039F-CB0C-E14D-A7EF-3BACE2CEF4EA}" type="datetimeFigureOut">
               <a:rPr lang="en-US" smtClean="0"/>
-              <a:t>9/28/2016</a:t>
+              <a:t>9/29/2016</a:t>
             </a:fld>
             <a:endParaRPr lang="en-US"/>
           </a:p>
@@ -1308,7 +1309,7 @@
           <a:p>
             <a:fld id="{7181039F-CB0C-E14D-A7EF-3BACE2CEF4EA}" type="datetimeFigureOut">
               <a:rPr lang="en-US" smtClean="0"/>
-              <a:t>9/28/2016</a:t>
+              <a:t>9/29/2016</a:t>
             </a:fld>
             <a:endParaRPr lang="en-US"/>
           </a:p>
@@ -1471,7 +1472,7 @@
           <a:p>
             <a:fld id="{7181039F-CB0C-E14D-A7EF-3BACE2CEF4EA}" type="datetimeFigureOut">
               <a:rPr lang="en-US" smtClean="0"/>
-              <a:t>9/28/2016</a:t>
+              <a:t>9/29/2016</a:t>
             </a:fld>
             <a:endParaRPr lang="en-US"/>
           </a:p>
@@ -1748,7 +1749,7 @@
           <a:p>
             <a:fld id="{7181039F-CB0C-E14D-A7EF-3BACE2CEF4EA}" type="datetimeFigureOut">
               <a:rPr lang="en-US" smtClean="0"/>
-              <a:t>9/28/2016</a:t>
+              <a:t>9/29/2016</a:t>
             </a:fld>
             <a:endParaRPr lang="en-US"/>
           </a:p>
@@ -2007,7 +2008,7 @@
           <a:p>
             <a:fld id="{7181039F-CB0C-E14D-A7EF-3BACE2CEF4EA}" type="datetimeFigureOut">
               <a:rPr lang="en-US" smtClean="0"/>
-              <a:t>9/28/2016</a:t>
+              <a:t>9/29/2016</a:t>
             </a:fld>
             <a:endParaRPr lang="en-US"/>
           </a:p>
@@ -2220,7 +2221,7 @@
           <a:p>
             <a:fld id="{7181039F-CB0C-E14D-A7EF-3BACE2CEF4EA}" type="datetimeFigureOut">
               <a:rPr lang="en-US" smtClean="0"/>
-              <a:t>9/28/2016</a:t>
+              <a:t>9/29/2016</a:t>
             </a:fld>
             <a:endParaRPr lang="en-US"/>
           </a:p>
@@ -2901,7 +2902,7 @@
                 <a:cs typeface="Miriam" panose="020B0502050101010101" pitchFamily="34" charset="-79"/>
               </a:rPr>
               <a:pPr algn="ctr"/>
-              <a:t>September 28, 2016</a:t>
+              <a:t>September 29, 2016</a:t>
             </a:fld>
             <a:endParaRPr lang="en-US" sz="1600" dirty="0" smtClean="0">
               <a:latin typeface="Miriam" panose="020B0502050101010101" pitchFamily="34" charset="-79"/>
@@ -3177,14 +3178,9 @@
           <a:p>
             <a:r>
               <a:rPr lang="en-US" dirty="0" smtClean="0"/>
-              <a:t>Line/scatter</a:t>
-            </a:r>
-          </a:p>
-          <a:p>
-            <a:r>
-              <a:rPr lang="en-US" dirty="0" smtClean="0"/>
               <a:t>histogram</a:t>
             </a:r>
+            <a:endParaRPr lang="en-US" dirty="0" smtClean="0"/>
           </a:p>
           <a:p>
             <a:r>
@@ -3199,13 +3195,11 @@
           <a:p>
             <a:r>
               <a:rPr lang="en-US" dirty="0" smtClean="0"/>
-              <a:t>XKCD style</a:t>
-            </a:r>
-          </a:p>
-          <a:p>
-            <a:r>
-              <a:rPr lang="en-US" dirty="0" smtClean="0"/>
-              <a:t>Swag examples, including annotation (</a:t>
+              <a:t>Swag </a:t>
+            </a:r>
+            <a:r>
+              <a:rPr lang="en-US" dirty="0" smtClean="0"/>
+              <a:t>examples, including annotation (</a:t>
             </a:r>
             <a:r>
               <a:rPr lang="en-US" dirty="0" err="1" smtClean="0"/>
@@ -3213,7 +3207,25 @@
             </a:r>
             <a:r>
               <a:rPr lang="en-US" dirty="0" smtClean="0"/>
-              <a:t> callout)</a:t>
+              <a:t> callout</a:t>
+            </a:r>
+            <a:r>
+              <a:rPr lang="en-US" dirty="0" smtClean="0"/>
+              <a:t>)</a:t>
+            </a:r>
+          </a:p>
+          <a:p>
+            <a:r>
+              <a:rPr lang="en-US" dirty="0" smtClean="0"/>
+              <a:t>Strings support </a:t>
+            </a:r>
+            <a:r>
+              <a:rPr lang="en-US" dirty="0" err="1" smtClean="0"/>
+              <a:t>LaTeX</a:t>
+            </a:r>
+            <a:r>
+              <a:rPr lang="en-US" dirty="0" smtClean="0"/>
+              <a:t> with $, and Python’s string formatting is a powerful tool</a:t>
             </a:r>
             <a:endParaRPr lang="en-US" dirty="0"/>
           </a:p>
@@ -3229,6 +3241,13 @@
   <p:clrMapOvr>
     <a:masterClrMapping/>
   </p:clrMapOvr>
+  <p:timing>
+    <p:tnLst>
+      <p:par>
+        <p:cTn id="1" dur="indefinite" restart="never" nodeType="tmRoot"/>
+      </p:par>
+    </p:tnLst>
+  </p:timing>
 </p:sld>
 </file>
 
@@ -3265,8 +3284,8 @@
           <a:lstStyle/>
           <a:p>
             <a:r>
-              <a:rPr lang="en-US" dirty="0" err="1" smtClean="0"/>
-              <a:t>seaborn</a:t>
+              <a:rPr lang="en-US" dirty="0" smtClean="0"/>
+              <a:t>A very pretty example…</a:t>
             </a:r>
             <a:endParaRPr lang="en-US" dirty="0"/>
           </a:p>
@@ -3289,32 +3308,49 @@
           <a:p>
             <a:r>
               <a:rPr lang="en-US" dirty="0" smtClean="0"/>
-              <a:t>At minimum: nicer styling than </a:t>
+              <a:t>Apparently, </a:t>
             </a:r>
             <a:r>
               <a:rPr lang="en-US" dirty="0" err="1" smtClean="0"/>
-              <a:t>matplotlib</a:t>
-            </a:r>
-            <a:r>
-              <a:rPr lang="en-US" dirty="0" smtClean="0"/>
-              <a:t> defaults…</a:t>
-            </a:r>
-          </a:p>
-          <a:p>
-            <a:r>
-              <a:rPr lang="en-US" dirty="0" smtClean="0"/>
-              <a:t>At best: save yourself from reinventing the same wheel over and over and over…</a:t>
-            </a:r>
-          </a:p>
-          <a:p>
-            <a:r>
-              <a:rPr lang="en-US" dirty="0" err="1" smtClean="0"/>
-              <a:t>Heatmap</a:t>
-            </a:r>
-            <a:r>
-              <a:rPr lang="en-US" dirty="0" smtClean="0"/>
-              <a:t>, joint plot</a:t>
-            </a:r>
+              <a:t>SciPy</a:t>
+            </a:r>
+            <a:r>
+              <a:rPr lang="en-US" dirty="0" smtClean="0"/>
+              <a:t> has a plotting contest each year!  I highly recommend a look!</a:t>
+            </a:r>
+          </a:p>
+          <a:p>
+            <a:r>
+              <a:rPr lang="en-US" dirty="0" smtClean="0"/>
+              <a:t>One example from 2014</a:t>
+            </a:r>
+          </a:p>
+          <a:p>
+            <a:pPr lvl="1"/>
+            <a:r>
+              <a:rPr lang="en-US" dirty="0" smtClean="0">
+                <a:hlinkClick r:id="rId2"/>
+              </a:rPr>
+              <a:t>http</a:t>
+            </a:r>
+            <a:r>
+              <a:rPr lang="en-US" dirty="0">
+                <a:hlinkClick r:id="rId2"/>
+              </a:rPr>
+              <a:t>://gregj.net/JHEPC</a:t>
+            </a:r>
+            <a:r>
+              <a:rPr lang="en-US" dirty="0" smtClean="0">
+                <a:hlinkClick r:id="rId2"/>
+              </a:rPr>
+              <a:t>/</a:t>
+            </a:r>
+            <a:r>
+              <a:rPr lang="en-US" dirty="0" smtClean="0"/>
+              <a:t> </a:t>
+            </a:r>
+          </a:p>
+          <a:p>
             <a:endParaRPr lang="en-US" dirty="0"/>
           </a:p>
         </p:txBody>
@@ -3322,13 +3358,20 @@
     </p:spTree>
     <p:extLst>
       <p:ext uri="{BB962C8B-B14F-4D97-AF65-F5344CB8AC3E}">
-        <p14:creationId xmlns:p14="http://schemas.microsoft.com/office/powerpoint/2010/main" val="1635058179"/>
+        <p14:creationId xmlns:p14="http://schemas.microsoft.com/office/powerpoint/2010/main" val="1064932069"/>
       </p:ext>
     </p:extLst>
   </p:cSld>
   <p:clrMapOvr>
     <a:masterClrMapping/>
   </p:clrMapOvr>
+  <p:timing>
+    <p:tnLst>
+      <p:par>
+        <p:cTn id="1" dur="indefinite" restart="never" nodeType="tmRoot"/>
+      </p:par>
+    </p:tnLst>
+  </p:timing>
 </p:sld>
 </file>
 
@@ -3366,7 +3409,7 @@
           <a:p>
             <a:r>
               <a:rPr lang="en-US" dirty="0" err="1" smtClean="0"/>
-              <a:t>bokeh</a:t>
+              <a:t>seaborn</a:t>
             </a:r>
             <a:endParaRPr lang="en-US" dirty="0"/>
           </a:p>
@@ -3389,34 +3432,87 @@
           <a:p>
             <a:r>
               <a:rPr lang="en-US" dirty="0" smtClean="0"/>
-              <a:t>Interactive graphs for the web</a:t>
-            </a:r>
-          </a:p>
-          <a:p>
-            <a:r>
-              <a:rPr lang="en-US" dirty="0" smtClean="0"/>
-              <a:t>With server backend, can produce very sophisticated interactions</a:t>
-            </a:r>
-          </a:p>
-          <a:p>
-            <a:r>
-              <a:rPr lang="en-US" dirty="0" smtClean="0"/>
-              <a:t>But even without, can provide nice dataset exploration tools</a:t>
-            </a:r>
-            <a:endParaRPr lang="en-US" dirty="0"/>
+              <a:t>At minimum: nicer styling than </a:t>
+            </a:r>
+            <a:r>
+              <a:rPr lang="en-US" dirty="0" err="1" smtClean="0"/>
+              <a:t>matplotlib</a:t>
+            </a:r>
+            <a:r>
+              <a:rPr lang="en-US" dirty="0" smtClean="0"/>
+              <a:t> defaults…</a:t>
+            </a:r>
+          </a:p>
+          <a:p>
+            <a:r>
+              <a:rPr lang="en-US" dirty="0" smtClean="0"/>
+              <a:t>At best: save yourself from reinventing the same wheel over and over and over…</a:t>
+            </a:r>
+          </a:p>
+          <a:p>
+            <a:r>
+              <a:rPr lang="en-US" dirty="0" err="1" smtClean="0"/>
+              <a:t>Heatmap</a:t>
+            </a:r>
+            <a:r>
+              <a:rPr lang="en-US" dirty="0" smtClean="0"/>
+              <a:t>, joint </a:t>
+            </a:r>
+            <a:r>
+              <a:rPr lang="en-US" dirty="0" smtClean="0"/>
+              <a:t>plot</a:t>
+            </a:r>
+          </a:p>
+          <a:p>
+            <a:r>
+              <a:rPr lang="en-US" dirty="0" smtClean="0"/>
+              <a:t>See </a:t>
+            </a:r>
+            <a:r>
+              <a:rPr lang="en-US" dirty="0" err="1" smtClean="0">
+                <a:solidFill>
+                  <a:schemeClr val="tx2"/>
+                </a:solidFill>
+              </a:rPr>
+              <a:t>seaborn.ipynb</a:t>
+            </a:r>
+            <a:r>
+              <a:rPr lang="en-US" dirty="0" smtClean="0">
+                <a:solidFill>
+                  <a:schemeClr val="tx2"/>
+                </a:solidFill>
+              </a:rPr>
+              <a:t> </a:t>
+            </a:r>
+            <a:r>
+              <a:rPr lang="en-US" dirty="0" smtClean="0"/>
+              <a:t>for a whirlwind tour</a:t>
+            </a:r>
+            <a:endParaRPr lang="en-US" dirty="0">
+              <a:solidFill>
+                <a:schemeClr val="tx2"/>
+              </a:solidFill>
+            </a:endParaRPr>
           </a:p>
         </p:txBody>
       </p:sp>
     </p:spTree>
     <p:extLst>
       <p:ext uri="{BB962C8B-B14F-4D97-AF65-F5344CB8AC3E}">
-        <p14:creationId xmlns:p14="http://schemas.microsoft.com/office/powerpoint/2010/main" val="2072717869"/>
+        <p14:creationId xmlns:p14="http://schemas.microsoft.com/office/powerpoint/2010/main" val="1635058179"/>
       </p:ext>
     </p:extLst>
   </p:cSld>
   <p:clrMapOvr>
     <a:masterClrMapping/>
   </p:clrMapOvr>
+  <p:timing>
+    <p:tnLst>
+      <p:par>
+        <p:cTn id="1" dur="indefinite" restart="never" nodeType="tmRoot"/>
+      </p:par>
+    </p:tnLst>
+  </p:timing>
 </p:sld>
 </file>
 
@@ -3453,8 +3549,8 @@
           <a:lstStyle/>
           <a:p>
             <a:r>
-              <a:rPr lang="en-US" dirty="0" smtClean="0"/>
-              <a:t>Other libraries of interest</a:t>
+              <a:rPr lang="en-US" dirty="0" err="1" smtClean="0"/>
+              <a:t>bokeh</a:t>
             </a:r>
             <a:endParaRPr lang="en-US" dirty="0"/>
           </a:p>
@@ -3476,16 +3572,20 @@
           <a:lstStyle/>
           <a:p>
             <a:r>
-              <a:rPr lang="en-US" dirty="0" err="1" smtClean="0"/>
-              <a:t>ggplot</a:t>
-            </a:r>
-            <a:r>
-              <a:rPr lang="en-US" dirty="0" smtClean="0"/>
-              <a:t>, mpld3, </a:t>
-            </a:r>
-            <a:r>
-              <a:rPr lang="en-US" dirty="0" err="1" smtClean="0"/>
-              <a:t>datashader</a:t>
+              <a:rPr lang="en-US" dirty="0" smtClean="0"/>
+              <a:t>Interactive graphs for the web</a:t>
+            </a:r>
+          </a:p>
+          <a:p>
+            <a:r>
+              <a:rPr lang="en-US" dirty="0" smtClean="0"/>
+              <a:t>With server backend, can produce very sophisticated interactions</a:t>
+            </a:r>
+          </a:p>
+          <a:p>
+            <a:r>
+              <a:rPr lang="en-US" dirty="0" smtClean="0"/>
+              <a:t>But even without, can provide nice dataset exploration tools</a:t>
             </a:r>
             <a:endParaRPr lang="en-US" dirty="0"/>
           </a:p>
@@ -3494,13 +3594,20 @@
     </p:spTree>
     <p:extLst>
       <p:ext uri="{BB962C8B-B14F-4D97-AF65-F5344CB8AC3E}">
-        <p14:creationId xmlns:p14="http://schemas.microsoft.com/office/powerpoint/2010/main" val="3995809367"/>
+        <p14:creationId xmlns:p14="http://schemas.microsoft.com/office/powerpoint/2010/main" val="2072717869"/>
       </p:ext>
     </p:extLst>
   </p:cSld>
   <p:clrMapOvr>
     <a:masterClrMapping/>
   </p:clrMapOvr>
+  <p:timing>
+    <p:tnLst>
+      <p:par>
+        <p:cTn id="1" dur="indefinite" restart="never" nodeType="tmRoot"/>
+      </p:par>
+    </p:tnLst>
+  </p:timing>
 </p:sld>
 </file>
 
@@ -3531,19 +3638,45 @@
             <p:ph type="title"/>
           </p:nvPr>
         </p:nvSpPr>
-        <p:spPr>
-          <a:xfrm>
-            <a:off x="457200" y="2874722"/>
-            <a:ext cx="8229600" cy="803756"/>
-          </a:xfrm>
-        </p:spPr>
+        <p:spPr/>
         <p:txBody>
           <a:bodyPr/>
           <a:lstStyle/>
           <a:p>
             <a:r>
               <a:rPr lang="en-US" dirty="0" smtClean="0"/>
-              <a:t>Thank you!</a:t>
+              <a:t>Other libraries of interest</a:t>
+            </a:r>
+            <a:endParaRPr lang="en-US" dirty="0"/>
+          </a:p>
+        </p:txBody>
+      </p:sp>
+      <p:sp>
+        <p:nvSpPr>
+          <p:cNvPr id="3" name="Content Placeholder 2"/>
+          <p:cNvSpPr>
+            <a:spLocks noGrp="1"/>
+          </p:cNvSpPr>
+          <p:nvPr>
+            <p:ph idx="1"/>
+          </p:nvPr>
+        </p:nvSpPr>
+        <p:spPr/>
+        <p:txBody>
+          <a:bodyPr/>
+          <a:lstStyle/>
+          <a:p>
+            <a:r>
+              <a:rPr lang="en-US" dirty="0" err="1" smtClean="0"/>
+              <a:t>ggplot</a:t>
+            </a:r>
+            <a:r>
+              <a:rPr lang="en-US" dirty="0" smtClean="0"/>
+              <a:t>, mpld3, </a:t>
+            </a:r>
+            <a:r>
+              <a:rPr lang="en-US" dirty="0" err="1" smtClean="0"/>
+              <a:t>datashader</a:t>
             </a:r>
             <a:endParaRPr lang="en-US" dirty="0"/>
           </a:p>
@@ -3552,13 +3685,20 @@
     </p:spTree>
     <p:extLst>
       <p:ext uri="{BB962C8B-B14F-4D97-AF65-F5344CB8AC3E}">
-        <p14:creationId xmlns:p14="http://schemas.microsoft.com/office/powerpoint/2010/main" val="1844849267"/>
+        <p14:creationId xmlns:p14="http://schemas.microsoft.com/office/powerpoint/2010/main" val="3995809367"/>
       </p:ext>
     </p:extLst>
   </p:cSld>
   <p:clrMapOvr>
     <a:masterClrMapping/>
   </p:clrMapOvr>
+  <p:timing>
+    <p:tnLst>
+      <p:par>
+        <p:cTn id="1" dur="indefinite" restart="never" nodeType="tmRoot"/>
+      </p:par>
+    </p:tnLst>
+  </p:timing>
 </p:sld>
 </file>
 
@@ -3589,27 +3729,62 @@
             <p:ph type="title"/>
           </p:nvPr>
         </p:nvSpPr>
-        <p:spPr/>
+        <p:spPr>
+          <a:xfrm>
+            <a:off x="457200" y="2874722"/>
+            <a:ext cx="8229600" cy="803756"/>
+          </a:xfrm>
+        </p:spPr>
         <p:txBody>
           <a:bodyPr/>
           <a:lstStyle/>
           <a:p>
             <a:r>
               <a:rPr lang="en-US" dirty="0" smtClean="0"/>
-              <a:t>Backup Slides</a:t>
+              <a:t>Thank you!</a:t>
             </a:r>
             <a:endParaRPr lang="en-US" dirty="0"/>
           </a:p>
         </p:txBody>
       </p:sp>
-      <p:sp>
-        <p:nvSpPr>
-          <p:cNvPr id="3" name="Content Placeholder 2"/>
-          <p:cNvSpPr>
-            <a:spLocks noGrp="1"/>
-          </p:cNvSpPr>
-          <p:nvPr>
-            <p:ph idx="1"/>
+    </p:spTree>
+    <p:extLst>
+      <p:ext uri="{BB962C8B-B14F-4D97-AF65-F5344CB8AC3E}">
+        <p14:creationId xmlns:p14="http://schemas.microsoft.com/office/powerpoint/2010/main" val="1844849267"/>
+      </p:ext>
+    </p:extLst>
+  </p:cSld>
+  <p:clrMapOvr>
+    <a:masterClrMapping/>
+  </p:clrMapOvr>
+</p:sld>
+</file>
+
+<file path=ppt/slides/slide16.xml><?xml version="1.0" encoding="utf-8"?>
+<p:sld xmlns:a="http://schemas.openxmlformats.org/drawingml/2006/main" xmlns:r="http://schemas.openxmlformats.org/officeDocument/2006/relationships" xmlns:p="http://schemas.openxmlformats.org/presentationml/2006/main">
+  <p:cSld>
+    <p:spTree>
+      <p:nvGrpSpPr>
+        <p:cNvPr id="1" name=""/>
+        <p:cNvGrpSpPr/>
+        <p:nvPr/>
+      </p:nvGrpSpPr>
+      <p:grpSpPr>
+        <a:xfrm>
+          <a:off x="0" y="0"/>
+          <a:ext cx="0" cy="0"/>
+          <a:chOff x="0" y="0"/>
+          <a:chExt cx="0" cy="0"/>
+        </a:xfrm>
+      </p:grpSpPr>
+      <p:sp>
+        <p:nvSpPr>
+          <p:cNvPr id="2" name="Title 1"/>
+          <p:cNvSpPr>
+            <a:spLocks noGrp="1"/>
+          </p:cNvSpPr>
+          <p:nvPr>
+            <p:ph type="title"/>
           </p:nvPr>
         </p:nvSpPr>
         <p:spPr/>
@@ -3617,7 +3792,30 @@
           <a:bodyPr/>
           <a:lstStyle/>
           <a:p>
-            <a:endParaRPr lang="en-US"/>
+            <a:r>
+              <a:rPr lang="en-US" dirty="0" smtClean="0"/>
+              <a:t>Backup Slides</a:t>
+            </a:r>
+            <a:endParaRPr lang="en-US" dirty="0"/>
+          </a:p>
+        </p:txBody>
+      </p:sp>
+      <p:sp>
+        <p:nvSpPr>
+          <p:cNvPr id="3" name="Content Placeholder 2"/>
+          <p:cNvSpPr>
+            <a:spLocks noGrp="1"/>
+          </p:cNvSpPr>
+          <p:nvPr>
+            <p:ph idx="1"/>
+          </p:nvPr>
+        </p:nvSpPr>
+        <p:spPr/>
+        <p:txBody>
+          <a:bodyPr/>
+          <a:lstStyle/>
+          <a:p>
+            <a:endParaRPr lang="en-US" dirty="0"/>
           </a:p>
         </p:txBody>
       </p:sp>
@@ -3631,6 +3829,13 @@
   <p:clrMapOvr>
     <a:masterClrMapping/>
   </p:clrMapOvr>
+  <p:timing>
+    <p:tnLst>
+      <p:par>
+        <p:cTn id="1" dur="indefinite" restart="never" nodeType="tmRoot"/>
+      </p:par>
+    </p:tnLst>
+  </p:timing>
 </p:sld>
 </file>
 
@@ -3744,7 +3949,7 @@
         </p:blipFill>
         <p:spPr bwMode="auto">
           <a:xfrm>
-            <a:off x="2547937" y="3830637"/>
+            <a:off x="2675466" y="3297238"/>
             <a:ext cx="4048125" cy="2295526"/>
           </a:xfrm>
           <a:prstGeom prst="rect">
@@ -3770,7 +3975,7 @@
         </p:nvSpPr>
         <p:spPr>
           <a:xfrm>
-            <a:off x="2611701" y="6370083"/>
+            <a:off x="2739230" y="5594704"/>
             <a:ext cx="3920596" cy="276999"/>
           </a:xfrm>
           <a:prstGeom prst="rect">
@@ -3794,11 +3999,7 @@
             </a:r>
             <a:r>
               <a:rPr lang="en-US" sz="1200" dirty="0" smtClean="0"/>
-              <a:t>/ under </a:t>
-            </a:r>
-            <a:r>
-              <a:rPr lang="en-US" sz="1200" dirty="0" smtClean="0"/>
-              <a:t>CC BY-NC 2.5</a:t>
+              <a:t>/ under CC BY-NC 2.5</a:t>
             </a:r>
             <a:endParaRPr lang="en-US" sz="1200" dirty="0"/>
           </a:p>
@@ -3814,6 +4015,13 @@
   <p:clrMapOvr>
     <a:masterClrMapping/>
   </p:clrMapOvr>
+  <p:timing>
+    <p:tnLst>
+      <p:par>
+        <p:cTn id="1" dur="indefinite" restart="never" nodeType="tmRoot"/>
+      </p:par>
+    </p:tnLst>
+  </p:timing>
 </p:sld>
 </file>
 
@@ -3935,7 +4143,226 @@
   <p:timing>
     <p:tnLst>
       <p:par>
-        <p:cTn id="1" dur="indefinite" restart="never" nodeType="tmRoot"/>
+        <p:cTn id="1" dur="indefinite" restart="never" nodeType="tmRoot">
+          <p:childTnLst>
+            <p:seq concurrent="1" nextAc="seek">
+              <p:cTn id="2" dur="indefinite" nodeType="mainSeq">
+                <p:childTnLst>
+                  <p:par>
+                    <p:cTn id="3" fill="hold">
+                      <p:stCondLst>
+                        <p:cond delay="indefinite"/>
+                      </p:stCondLst>
+                      <p:childTnLst>
+                        <p:par>
+                          <p:cTn id="4" fill="hold">
+                            <p:stCondLst>
+                              <p:cond delay="0"/>
+                            </p:stCondLst>
+                            <p:childTnLst>
+                              <p:par>
+                                <p:cTn id="5" presetID="1" presetClass="entr" presetSubtype="0" fill="hold" nodeType="clickEffect">
+                                  <p:stCondLst>
+                                    <p:cond delay="0"/>
+                                  </p:stCondLst>
+                                  <p:childTnLst>
+                                    <p:set>
+                                      <p:cBhvr>
+                                        <p:cTn id="6" dur="1" fill="hold">
+                                          <p:stCondLst>
+                                            <p:cond delay="0"/>
+                                          </p:stCondLst>
+                                        </p:cTn>
+                                        <p:tgtEl>
+                                          <p:spTgt spid="3">
+                                            <p:txEl>
+                                              <p:pRg st="1" end="1"/>
+                                            </p:txEl>
+                                          </p:spTgt>
+                                        </p:tgtEl>
+                                        <p:attrNameLst>
+                                          <p:attrName>style.visibility</p:attrName>
+                                        </p:attrNameLst>
+                                      </p:cBhvr>
+                                      <p:to>
+                                        <p:strVal val="visible"/>
+                                      </p:to>
+                                    </p:set>
+                                  </p:childTnLst>
+                                </p:cTn>
+                              </p:par>
+                            </p:childTnLst>
+                          </p:cTn>
+                        </p:par>
+                      </p:childTnLst>
+                    </p:cTn>
+                  </p:par>
+                  <p:par>
+                    <p:cTn id="7" fill="hold">
+                      <p:stCondLst>
+                        <p:cond delay="indefinite"/>
+                      </p:stCondLst>
+                      <p:childTnLst>
+                        <p:par>
+                          <p:cTn id="8" fill="hold">
+                            <p:stCondLst>
+                              <p:cond delay="0"/>
+                            </p:stCondLst>
+                            <p:childTnLst>
+                              <p:par>
+                                <p:cTn id="9" presetID="1" presetClass="entr" presetSubtype="0" fill="hold" nodeType="clickEffect">
+                                  <p:stCondLst>
+                                    <p:cond delay="0"/>
+                                  </p:stCondLst>
+                                  <p:childTnLst>
+                                    <p:set>
+                                      <p:cBhvr>
+                                        <p:cTn id="10" dur="1" fill="hold">
+                                          <p:stCondLst>
+                                            <p:cond delay="0"/>
+                                          </p:stCondLst>
+                                        </p:cTn>
+                                        <p:tgtEl>
+                                          <p:spTgt spid="3">
+                                            <p:txEl>
+                                              <p:pRg st="2" end="2"/>
+                                            </p:txEl>
+                                          </p:spTgt>
+                                        </p:tgtEl>
+                                        <p:attrNameLst>
+                                          <p:attrName>style.visibility</p:attrName>
+                                        </p:attrNameLst>
+                                      </p:cBhvr>
+                                      <p:to>
+                                        <p:strVal val="visible"/>
+                                      </p:to>
+                                    </p:set>
+                                  </p:childTnLst>
+                                </p:cTn>
+                              </p:par>
+                            </p:childTnLst>
+                          </p:cTn>
+                        </p:par>
+                      </p:childTnLst>
+                    </p:cTn>
+                  </p:par>
+                  <p:par>
+                    <p:cTn id="11" fill="hold">
+                      <p:stCondLst>
+                        <p:cond delay="indefinite"/>
+                      </p:stCondLst>
+                      <p:childTnLst>
+                        <p:par>
+                          <p:cTn id="12" fill="hold">
+                            <p:stCondLst>
+                              <p:cond delay="0"/>
+                            </p:stCondLst>
+                            <p:childTnLst>
+                              <p:par>
+                                <p:cTn id="13" presetID="1" presetClass="entr" presetSubtype="0" fill="hold" nodeType="clickEffect">
+                                  <p:stCondLst>
+                                    <p:cond delay="0"/>
+                                  </p:stCondLst>
+                                  <p:childTnLst>
+                                    <p:set>
+                                      <p:cBhvr>
+                                        <p:cTn id="14" dur="1" fill="hold">
+                                          <p:stCondLst>
+                                            <p:cond delay="0"/>
+                                          </p:stCondLst>
+                                        </p:cTn>
+                                        <p:tgtEl>
+                                          <p:spTgt spid="3">
+                                            <p:txEl>
+                                              <p:pRg st="3" end="3"/>
+                                            </p:txEl>
+                                          </p:spTgt>
+                                        </p:tgtEl>
+                                        <p:attrNameLst>
+                                          <p:attrName>style.visibility</p:attrName>
+                                        </p:attrNameLst>
+                                      </p:cBhvr>
+                                      <p:to>
+                                        <p:strVal val="visible"/>
+                                      </p:to>
+                                    </p:set>
+                                  </p:childTnLst>
+                                </p:cTn>
+                              </p:par>
+                            </p:childTnLst>
+                          </p:cTn>
+                        </p:par>
+                      </p:childTnLst>
+                    </p:cTn>
+                  </p:par>
+                  <p:par>
+                    <p:cTn id="15" fill="hold">
+                      <p:stCondLst>
+                        <p:cond delay="indefinite"/>
+                      </p:stCondLst>
+                      <p:childTnLst>
+                        <p:par>
+                          <p:cTn id="16" fill="hold">
+                            <p:stCondLst>
+                              <p:cond delay="0"/>
+                            </p:stCondLst>
+                            <p:childTnLst>
+                              <p:par>
+                                <p:cTn id="17" presetID="1" presetClass="entr" presetSubtype="0" fill="hold" nodeType="clickEffect">
+                                  <p:stCondLst>
+                                    <p:cond delay="0"/>
+                                  </p:stCondLst>
+                                  <p:childTnLst>
+                                    <p:set>
+                                      <p:cBhvr>
+                                        <p:cTn id="18" dur="1" fill="hold">
+                                          <p:stCondLst>
+                                            <p:cond delay="0"/>
+                                          </p:stCondLst>
+                                        </p:cTn>
+                                        <p:tgtEl>
+                                          <p:spTgt spid="3">
+                                            <p:txEl>
+                                              <p:pRg st="4" end="4"/>
+                                            </p:txEl>
+                                          </p:spTgt>
+                                        </p:tgtEl>
+                                        <p:attrNameLst>
+                                          <p:attrName>style.visibility</p:attrName>
+                                        </p:attrNameLst>
+                                      </p:cBhvr>
+                                      <p:to>
+                                        <p:strVal val="visible"/>
+                                      </p:to>
+                                    </p:set>
+                                  </p:childTnLst>
+                                </p:cTn>
+                              </p:par>
+                            </p:childTnLst>
+                          </p:cTn>
+                        </p:par>
+                      </p:childTnLst>
+                    </p:cTn>
+                  </p:par>
+                </p:childTnLst>
+              </p:cTn>
+              <p:prevCondLst>
+                <p:cond evt="onPrev" delay="0">
+                  <p:tgtEl>
+                    <p:sldTgt/>
+                  </p:tgtEl>
+                </p:cond>
+              </p:prevCondLst>
+              <p:nextCondLst>
+                <p:cond evt="onNext" delay="0">
+                  <p:tgtEl>
+                    <p:sldTgt/>
+                  </p:tgtEl>
+                </p:cond>
+              </p:nextCondLst>
+            </p:seq>
+          </p:childTnLst>
+        </p:cTn>
       </p:par>
     </p:tnLst>
   </p:timing>
@@ -4514,14 +4941,22 @@
             <a:r>
               <a:rPr lang="en-US" dirty="0" err="1" smtClean="0">
                 <a:solidFill>
-                  <a:schemeClr val="accent1"/>
+                  <a:schemeClr val="tx2"/>
                 </a:solidFill>
               </a:rPr>
               <a:t>matplotlib</a:t>
             </a:r>
             <a:r>
-              <a:rPr lang="en-US" dirty="0" smtClean="0"/>
-              <a:t> top-level: graphics backend control, default parameters</a:t>
+              <a:rPr lang="en-US" dirty="0" smtClean="0">
+                <a:solidFill>
+                  <a:schemeClr val="tx2"/>
+                </a:solidFill>
+              </a:rPr>
+              <a:t> </a:t>
+            </a:r>
+            <a:r>
+              <a:rPr lang="en-US" dirty="0" smtClean="0"/>
+              <a:t>top-level: graphics backend control, default parameters</a:t>
             </a:r>
           </a:p>
           <a:p>
@@ -4529,7 +4964,7 @@
             <a:r>
               <a:rPr lang="en-US" dirty="0" err="1" smtClean="0">
                 <a:solidFill>
-                  <a:schemeClr val="accent1"/>
+                  <a:schemeClr val="tx2"/>
                 </a:solidFill>
               </a:rPr>
               <a:t>pyplot</a:t>
@@ -4544,7 +4979,7 @@
             <a:r>
               <a:rPr lang="en-US" dirty="0" smtClean="0">
                 <a:solidFill>
-                  <a:schemeClr val="accent1"/>
+                  <a:schemeClr val="tx2"/>
                 </a:solidFill>
               </a:rPr>
               <a:t>cm</a:t>
@@ -4582,6 +5017,13 @@
   <p:clrMapOvr>
     <a:masterClrMapping/>
   </p:clrMapOvr>
+  <p:timing>
+    <p:tnLst>
+      <p:par>
+        <p:cTn id="1" dur="indefinite" restart="never" nodeType="tmRoot"/>
+      </p:par>
+    </p:tnLst>
+  </p:timing>
 </p:sld>
 </file>
 
@@ -4787,28 +5229,22 @@
           <a:p>
             <a:pPr lvl="1"/>
             <a:r>
-              <a:rPr lang="en-US" dirty="0" smtClean="0">
-                <a:hlinkClick r:id="rId2"/>
+              <a:rPr lang="en-US" dirty="0" smtClean="0"/>
+              <a:t>See </a:t>
+            </a:r>
+            <a:r>
+              <a:rPr lang="en-US" dirty="0" err="1" smtClean="0">
+                <a:solidFill>
+                  <a:schemeClr val="tx2"/>
+                </a:solidFill>
               </a:rPr>
-              <a:t>https</a:t>
-            </a:r>
-            <a:r>
-              <a:rPr lang="en-US" dirty="0">
-                <a:hlinkClick r:id="rId2"/>
-              </a:rPr>
-              <a:t>://</a:t>
-            </a:r>
-            <a:r>
-              <a:rPr lang="en-US" dirty="0" smtClean="0">
-                <a:hlinkClick r:id="rId2"/>
-              </a:rPr>
-              <a:t>github.com/rougier/figure-anatomy</a:t>
-            </a:r>
-            <a:r>
-              <a:rPr lang="en-US" dirty="0" smtClean="0"/>
-              <a:t> </a:t>
-            </a:r>
-            <a:endParaRPr lang="en-US" dirty="0"/>
+              <a:t>anatomy_of_matplotlib_figure.ipynb</a:t>
+            </a:r>
+            <a:endParaRPr lang="en-US" dirty="0">
+              <a:solidFill>
+                <a:schemeClr val="tx2"/>
+              </a:solidFill>
+            </a:endParaRPr>
           </a:p>
         </p:txBody>
       </p:sp>
@@ -4822,6 +5258,13 @@
   <p:clrMapOvr>
     <a:masterClrMapping/>
   </p:clrMapOvr>
+  <p:timing>
+    <p:tnLst>
+      <p:par>
+        <p:cTn id="1" dur="indefinite" restart="never" nodeType="tmRoot"/>
+      </p:par>
+    </p:tnLst>
+  </p:timing>
 </p:sld>
 </file>
 

</xml_diff>